<commit_message>
version used in talk
</commit_message>
<xml_diff>
--- a/ppt/gata2-tbx15-priceLabTalk-20dec2019.pptx
+++ b/ppt/gata2-tbx15-priceLabTalk-20dec2019.pptx
@@ -5,15 +5,22 @@
     <p:sldMasterId id="2147483648" r:id="rId1"/>
   </p:sldMasterIdLst>
   <p:sldIdLst>
-    <p:sldId id="256" r:id="rId2"/>
-    <p:sldId id="257" r:id="rId3"/>
-    <p:sldId id="258" r:id="rId4"/>
-    <p:sldId id="260" r:id="rId5"/>
-    <p:sldId id="266" r:id="rId6"/>
-    <p:sldId id="267" r:id="rId7"/>
-    <p:sldId id="261" r:id="rId8"/>
-    <p:sldId id="262" r:id="rId9"/>
-    <p:sldId id="259" r:id="rId10"/>
+    <p:sldId id="268" r:id="rId2"/>
+    <p:sldId id="278" r:id="rId3"/>
+    <p:sldId id="273" r:id="rId4"/>
+    <p:sldId id="269" r:id="rId5"/>
+    <p:sldId id="261" r:id="rId6"/>
+    <p:sldId id="262" r:id="rId7"/>
+    <p:sldId id="272" r:id="rId8"/>
+    <p:sldId id="277" r:id="rId9"/>
+    <p:sldId id="275" r:id="rId10"/>
+    <p:sldId id="276" r:id="rId11"/>
+    <p:sldId id="257" r:id="rId12"/>
+    <p:sldId id="258" r:id="rId13"/>
+    <p:sldId id="260" r:id="rId14"/>
+    <p:sldId id="266" r:id="rId15"/>
+    <p:sldId id="267" r:id="rId16"/>
+    <p:sldId id="259" r:id="rId17"/>
   </p:sldIdLst>
   <p:sldSz cx="12192000" cy="6858000"/>
   <p:notesSz cx="6858000" cy="9144000"/>
@@ -112,6 +119,11 @@
       </a:defRPr>
     </a:lvl9pPr>
   </p:defaultTextStyle>
+  <p:extLst>
+    <p:ext uri="{EFAFB233-063F-42B5-8137-9DF3F51BA10A}">
+      <p15:sldGuideLst xmlns:p15="http://schemas.microsoft.com/office/powerpoint/2012/main"/>
+    </p:ext>
+  </p:extLst>
 </p:presentation>
 </file>
 
@@ -942,7 +954,7 @@
           <a:p>
             <a:fld id="{369DA1CE-8211-734A-9C7A-554F2AA6F22E}" type="datetimeFigureOut">
               <a:rPr lang="en-US" smtClean="0"/>
-              <a:t>12/16/19</a:t>
+              <a:t>12/20/19</a:t>
             </a:fld>
             <a:endParaRPr lang="en-US"/>
           </a:p>
@@ -1140,7 +1152,7 @@
           <a:p>
             <a:fld id="{369DA1CE-8211-734A-9C7A-554F2AA6F22E}" type="datetimeFigureOut">
               <a:rPr lang="en-US" smtClean="0"/>
-              <a:t>12/16/19</a:t>
+              <a:t>12/20/19</a:t>
             </a:fld>
             <a:endParaRPr lang="en-US"/>
           </a:p>
@@ -1348,7 +1360,7 @@
           <a:p>
             <a:fld id="{369DA1CE-8211-734A-9C7A-554F2AA6F22E}" type="datetimeFigureOut">
               <a:rPr lang="en-US" smtClean="0"/>
-              <a:t>12/16/19</a:t>
+              <a:t>12/20/19</a:t>
             </a:fld>
             <a:endParaRPr lang="en-US"/>
           </a:p>
@@ -1546,7 +1558,7 @@
           <a:p>
             <a:fld id="{369DA1CE-8211-734A-9C7A-554F2AA6F22E}" type="datetimeFigureOut">
               <a:rPr lang="en-US" smtClean="0"/>
-              <a:t>12/16/19</a:t>
+              <a:t>12/20/19</a:t>
             </a:fld>
             <a:endParaRPr lang="en-US"/>
           </a:p>
@@ -1821,7 +1833,7 @@
           <a:p>
             <a:fld id="{369DA1CE-8211-734A-9C7A-554F2AA6F22E}" type="datetimeFigureOut">
               <a:rPr lang="en-US" smtClean="0"/>
-              <a:t>12/16/19</a:t>
+              <a:t>12/20/19</a:t>
             </a:fld>
             <a:endParaRPr lang="en-US"/>
           </a:p>
@@ -2086,7 +2098,7 @@
           <a:p>
             <a:fld id="{369DA1CE-8211-734A-9C7A-554F2AA6F22E}" type="datetimeFigureOut">
               <a:rPr lang="en-US" smtClean="0"/>
-              <a:t>12/16/19</a:t>
+              <a:t>12/20/19</a:t>
             </a:fld>
             <a:endParaRPr lang="en-US"/>
           </a:p>
@@ -2498,7 +2510,7 @@
           <a:p>
             <a:fld id="{369DA1CE-8211-734A-9C7A-554F2AA6F22E}" type="datetimeFigureOut">
               <a:rPr lang="en-US" smtClean="0"/>
-              <a:t>12/16/19</a:t>
+              <a:t>12/20/19</a:t>
             </a:fld>
             <a:endParaRPr lang="en-US"/>
           </a:p>
@@ -2639,7 +2651,7 @@
           <a:p>
             <a:fld id="{369DA1CE-8211-734A-9C7A-554F2AA6F22E}" type="datetimeFigureOut">
               <a:rPr lang="en-US" smtClean="0"/>
-              <a:t>12/16/19</a:t>
+              <a:t>12/20/19</a:t>
             </a:fld>
             <a:endParaRPr lang="en-US"/>
           </a:p>
@@ -2752,7 +2764,7 @@
           <a:p>
             <a:fld id="{369DA1CE-8211-734A-9C7A-554F2AA6F22E}" type="datetimeFigureOut">
               <a:rPr lang="en-US" smtClean="0"/>
-              <a:t>12/16/19</a:t>
+              <a:t>12/20/19</a:t>
             </a:fld>
             <a:endParaRPr lang="en-US"/>
           </a:p>
@@ -3063,7 +3075,7 @@
           <a:p>
             <a:fld id="{369DA1CE-8211-734A-9C7A-554F2AA6F22E}" type="datetimeFigureOut">
               <a:rPr lang="en-US" smtClean="0"/>
-              <a:t>12/16/19</a:t>
+              <a:t>12/20/19</a:t>
             </a:fld>
             <a:endParaRPr lang="en-US"/>
           </a:p>
@@ -3351,7 +3363,7 @@
           <a:p>
             <a:fld id="{369DA1CE-8211-734A-9C7A-554F2AA6F22E}" type="datetimeFigureOut">
               <a:rPr lang="en-US" smtClean="0"/>
-              <a:t>12/16/19</a:t>
+              <a:t>12/20/19</a:t>
             </a:fld>
             <a:endParaRPr lang="en-US"/>
           </a:p>
@@ -3592,7 +3604,7 @@
           <a:p>
             <a:fld id="{369DA1CE-8211-734A-9C7A-554F2AA6F22E}" type="datetimeFigureOut">
               <a:rPr lang="en-US" smtClean="0"/>
-              <a:t>12/16/19</a:t>
+              <a:t>12/20/19</a:t>
             </a:fld>
             <a:endParaRPr lang="en-US"/>
           </a:p>
@@ -4009,12 +4021,128 @@
           <a:chExt cx="0" cy="0"/>
         </a:xfrm>
       </p:grpSpPr>
+      <p:sp>
+        <p:nvSpPr>
+          <p:cNvPr id="4" name="TextBox 3">
+            <a:extLst>
+              <a:ext uri="{FF2B5EF4-FFF2-40B4-BE49-F238E27FC236}">
+                <a16:creationId xmlns:a16="http://schemas.microsoft.com/office/drawing/2014/main" id="{D70AFA3C-7CB5-DE44-BE63-E2C2E5BA5C33}"/>
+              </a:ext>
+            </a:extLst>
+          </p:cNvPr>
+          <p:cNvSpPr txBox="1"/>
+          <p:nvPr/>
+        </p:nvSpPr>
+        <p:spPr>
+          <a:xfrm>
+            <a:off x="1633881" y="1371600"/>
+            <a:ext cx="8924238" cy="523220"/>
+          </a:xfrm>
+          <a:prstGeom prst="rect">
+            <a:avLst/>
+          </a:prstGeom>
+          <a:noFill/>
+        </p:spPr>
+        <p:txBody>
+          <a:bodyPr wrap="none" rtlCol="0">
+            <a:spAutoFit/>
+          </a:bodyPr>
+          <a:lstStyle/>
+          <a:p>
+            <a:r>
+              <a:rPr lang="en-US" sz="2800" dirty="0"/>
+              <a:t>Using </a:t>
+            </a:r>
+            <a:r>
+              <a:rPr lang="en-US" sz="2800" dirty="0" err="1"/>
+              <a:t>trena</a:t>
+            </a:r>
+            <a:r>
+              <a:rPr lang="en-US" sz="2800" dirty="0"/>
+              <a:t> &amp; friends to explore regulation in erythropoiesis</a:t>
+            </a:r>
+          </a:p>
+        </p:txBody>
+      </p:sp>
+      <p:sp>
+        <p:nvSpPr>
+          <p:cNvPr id="5" name="TextBox 4">
+            <a:extLst>
+              <a:ext uri="{FF2B5EF4-FFF2-40B4-BE49-F238E27FC236}">
+                <a16:creationId xmlns:a16="http://schemas.microsoft.com/office/drawing/2014/main" id="{F96095AF-99A8-4843-A390-6A71EFE9D71B}"/>
+              </a:ext>
+            </a:extLst>
+          </p:cNvPr>
+          <p:cNvSpPr txBox="1"/>
+          <p:nvPr/>
+        </p:nvSpPr>
+        <p:spPr>
+          <a:xfrm>
+            <a:off x="3874430" y="3404681"/>
+            <a:ext cx="4443139" cy="369332"/>
+          </a:xfrm>
+          <a:prstGeom prst="rect">
+            <a:avLst/>
+          </a:prstGeom>
+          <a:noFill/>
+        </p:spPr>
+        <p:txBody>
+          <a:bodyPr wrap="none" rtlCol="0">
+            <a:spAutoFit/>
+          </a:bodyPr>
+          <a:lstStyle/>
+          <a:p>
+            <a:r>
+              <a:rPr lang="en-US" dirty="0"/>
+              <a:t>Master regulators:  GATA1, </a:t>
+            </a:r>
+            <a:r>
+              <a:rPr lang="en-US" b="1" dirty="0"/>
+              <a:t>GATA2</a:t>
+            </a:r>
+            <a:r>
+              <a:rPr lang="en-US" dirty="0"/>
+              <a:t>, KLF1, TAL1</a:t>
+            </a:r>
+          </a:p>
+        </p:txBody>
+      </p:sp>
+    </p:spTree>
+    <p:extLst>
+      <p:ext uri="{BB962C8B-B14F-4D97-AF65-F5344CB8AC3E}">
+        <p14:creationId xmlns:p14="http://schemas.microsoft.com/office/powerpoint/2010/main" val="3429098663"/>
+      </p:ext>
+    </p:extLst>
+  </p:cSld>
+  <p:clrMapOvr>
+    <a:masterClrMapping/>
+  </p:clrMapOvr>
+</p:sld>
+</file>
+
+<file path=ppt/slides/slide10.xml><?xml version="1.0" encoding="utf-8"?>
+<p:sld xmlns:a="http://schemas.openxmlformats.org/drawingml/2006/main" xmlns:r="http://schemas.openxmlformats.org/officeDocument/2006/relationships" xmlns:p="http://schemas.openxmlformats.org/presentationml/2006/main" show="0">
+  <p:cSld>
+    <p:spTree>
+      <p:nvGrpSpPr>
+        <p:cNvPr id="1" name=""/>
+        <p:cNvGrpSpPr/>
+        <p:nvPr/>
+      </p:nvGrpSpPr>
+      <p:grpSpPr>
+        <a:xfrm>
+          <a:off x="0" y="0"/>
+          <a:ext cx="0" cy="0"/>
+          <a:chOff x="0" y="0"/>
+          <a:chExt cx="0" cy="0"/>
+        </a:xfrm>
+      </p:grpSpPr>
       <p:pic>
         <p:nvPicPr>
           <p:cNvPr id="5" name="Picture 4">
             <a:extLst>
               <a:ext uri="{FF2B5EF4-FFF2-40B4-BE49-F238E27FC236}">
-                <a16:creationId xmlns:a16="http://schemas.microsoft.com/office/drawing/2014/main" id="{40C85951-5494-BB4D-8A78-2FC5F9F3A0B5}"/>
+                <a16:creationId xmlns:a16="http://schemas.microsoft.com/office/drawing/2014/main" id="{9DB2C9F7-42EB-8B49-AF75-FCC611409D0D}"/>
               </a:ext>
             </a:extLst>
           </p:cNvPr>
@@ -4031,61 +4159,18 @@
         </p:blipFill>
         <p:spPr>
           <a:xfrm>
-            <a:off x="905221" y="658325"/>
-            <a:ext cx="10381558" cy="6060189"/>
+            <a:off x="1079771" y="339521"/>
+            <a:ext cx="9465012" cy="5458163"/>
           </a:xfrm>
           <a:prstGeom prst="rect">
             <a:avLst/>
           </a:prstGeom>
         </p:spPr>
       </p:pic>
-      <p:sp>
-        <p:nvSpPr>
-          <p:cNvPr id="6" name="TextBox 5">
-            <a:extLst>
-              <a:ext uri="{FF2B5EF4-FFF2-40B4-BE49-F238E27FC236}">
-                <a16:creationId xmlns:a16="http://schemas.microsoft.com/office/drawing/2014/main" id="{FB9AEEB3-4B82-6D4B-92F8-32DAECAD4CB4}"/>
-              </a:ext>
-            </a:extLst>
-          </p:cNvPr>
-          <p:cNvSpPr txBox="1"/>
-          <p:nvPr/>
-        </p:nvSpPr>
-        <p:spPr>
-          <a:xfrm>
-            <a:off x="3293951" y="196660"/>
-            <a:ext cx="5604098" cy="461665"/>
-          </a:xfrm>
-          <a:prstGeom prst="rect">
-            <a:avLst/>
-          </a:prstGeom>
-          <a:noFill/>
-        </p:spPr>
-        <p:txBody>
-          <a:bodyPr wrap="none" rtlCol="0">
-            <a:spAutoFit/>
-          </a:bodyPr>
-          <a:lstStyle/>
-          <a:p>
-            <a:r>
-              <a:rPr lang="en-US" sz="2400" dirty="0"/>
-              <a:t>TBX15 TFBS: </a:t>
-            </a:r>
-            <a:r>
-              <a:rPr lang="en-US" sz="2400" dirty="0" err="1"/>
-              <a:t>GeneHancer</a:t>
-            </a:r>
-            <a:r>
-              <a:rPr lang="en-US" sz="2400" dirty="0"/>
-              <a:t>, phast7, ATAC-seq</a:t>
-            </a:r>
-          </a:p>
-        </p:txBody>
-      </p:sp>
     </p:spTree>
     <p:extLst>
       <p:ext uri="{BB962C8B-B14F-4D97-AF65-F5344CB8AC3E}">
-        <p14:creationId xmlns:p14="http://schemas.microsoft.com/office/powerpoint/2010/main" val="213625685"/>
+        <p14:creationId xmlns:p14="http://schemas.microsoft.com/office/powerpoint/2010/main" val="1037918723"/>
       </p:ext>
     </p:extLst>
   </p:cSld>
@@ -4095,7 +4180,7 @@
 </p:sld>
 </file>
 
-<file path=ppt/slides/slide2.xml><?xml version="1.0" encoding="utf-8"?>
+<file path=ppt/slides/slide11.xml><?xml version="1.0" encoding="utf-8"?>
 <p:sld xmlns:a="http://schemas.openxmlformats.org/drawingml/2006/main" xmlns:r="http://schemas.openxmlformats.org/officeDocument/2006/relationships" xmlns:p="http://schemas.openxmlformats.org/presentationml/2006/main">
   <p:cSld>
     <p:spTree>
@@ -4279,7 +4364,7 @@
 </p:sld>
 </file>
 
-<file path=ppt/slides/slide3.xml><?xml version="1.0" encoding="utf-8"?>
+<file path=ppt/slides/slide12.xml><?xml version="1.0" encoding="utf-8"?>
 <p:sld xmlns:a="http://schemas.openxmlformats.org/drawingml/2006/main" xmlns:r="http://schemas.openxmlformats.org/officeDocument/2006/relationships" xmlns:p="http://schemas.openxmlformats.org/presentationml/2006/main">
   <p:cSld>
     <p:spTree>
@@ -4420,7 +4505,7 @@
 </p:sld>
 </file>
 
-<file path=ppt/slides/slide4.xml><?xml version="1.0" encoding="utf-8"?>
+<file path=ppt/slides/slide13.xml><?xml version="1.0" encoding="utf-8"?>
 <p:sld xmlns:a="http://schemas.openxmlformats.org/drawingml/2006/main" xmlns:r="http://schemas.openxmlformats.org/officeDocument/2006/relationships" xmlns:p="http://schemas.openxmlformats.org/presentationml/2006/main">
   <p:cSld>
     <p:spTree>
@@ -4480,7 +4565,7 @@
 </p:sld>
 </file>
 
-<file path=ppt/slides/slide5.xml><?xml version="1.0" encoding="utf-8"?>
+<file path=ppt/slides/slide14.xml><?xml version="1.0" encoding="utf-8"?>
 <p:sld xmlns:a="http://schemas.openxmlformats.org/drawingml/2006/main" xmlns:r="http://schemas.openxmlformats.org/officeDocument/2006/relationships" xmlns:p="http://schemas.openxmlformats.org/presentationml/2006/main">
   <p:cSld>
     <p:spTree>
@@ -9769,7 +9854,7 @@
 </p:sld>
 </file>
 
-<file path=ppt/slides/slide6.xml><?xml version="1.0" encoding="utf-8"?>
+<file path=ppt/slides/slide15.xml><?xml version="1.0" encoding="utf-8"?>
 <p:sld xmlns:a="http://schemas.openxmlformats.org/drawingml/2006/main" xmlns:r="http://schemas.openxmlformats.org/officeDocument/2006/relationships" xmlns:p="http://schemas.openxmlformats.org/presentationml/2006/main">
   <p:cSld>
     <p:spTree>
@@ -9801,9 +9886,9 @@
         <p:grpSpPr>
           <a:xfrm>
             <a:off x="3469466" y="628650"/>
-            <a:ext cx="4755722" cy="5199570"/>
+            <a:ext cx="4755722" cy="3837659"/>
             <a:chOff x="-201922" y="19665"/>
-            <a:chExt cx="9219479" cy="8751188"/>
+            <a:chExt cx="9219479" cy="6459010"/>
           </a:xfrm>
         </p:grpSpPr>
         <p:graphicFrame>
@@ -10049,7 +10134,7 @@
           <p:spPr>
             <a:xfrm>
               <a:off x="88949" y="4419599"/>
-              <a:ext cx="8928608" cy="4351254"/>
+              <a:ext cx="8928608" cy="2059076"/>
             </a:xfrm>
             <a:prstGeom prst="rect">
               <a:avLst/>
@@ -10063,36 +10148,71 @@
             <a:p>
               <a:r>
                 <a:rPr lang="en-US" sz="1350" dirty="0"/>
-                <a:t>4 regions de putative binding for TBX15 close to the GATA2 gene:</a:t>
+                <a:t>4 regions de putative binding for TBX15 close to the GATA2 gene, </a:t>
               </a:r>
-            </a:p>
-            <a:p>
               <a:r>
-                <a:rPr lang="en-US" sz="1350" b="1" dirty="0"/>
-                <a:t>1: chr3:128,483,003-128,483,009    Hsapiens-jaspar2018-TBX15-MA0803.1  chr3       +   6.642737          0.8767398 AGGGGTGA</a:t>
+                <a:rPr lang="en-US" sz="1400" b="1" dirty="0">
+                  <a:latin typeface="Courier" pitchFamily="2" charset="0"/>
+                </a:rPr>
+                <a:t>Hsapiens-jaspar2018-TBX15-MA0803.1  chr3       +</a:t>
               </a:r>
               <a:endParaRPr lang="en-US" sz="1350" dirty="0"/>
             </a:p>
             <a:p>
               <a:r>
-                <a:rPr lang="en-US" sz="1350" b="1" dirty="0"/>
-                <a:t>  2: chr3:128,483,452-128,483,457    Hsapiens-jaspar2018-TBX15-MA0803.1  chr3       +   6.658030          0.8787582 CGGTGTGA</a:t>
+                <a:rPr lang="en-US" sz="800" b="1" dirty="0">
+                  <a:latin typeface="Courier" pitchFamily="2" charset="0"/>
+                </a:rPr>
+                <a:t>1: chr3:128,483,003-128,483,009   6.642737          0.8767398 AGGGGTGA</a:t>
               </a:r>
-              <a:endParaRPr lang="en-US" sz="1350" dirty="0"/>
+              <a:endParaRPr lang="en-US" sz="800" dirty="0">
+                <a:latin typeface="Courier" pitchFamily="2" charset="0"/>
+              </a:endParaRPr>
             </a:p>
             <a:p>
               <a:r>
-                <a:rPr lang="en-US" sz="1350" b="1" dirty="0"/>
-                <a:t>  3: chr3:128,486,956-128,486,962    Hsapiens-jaspar2018-TBX15-MA0803.1  chr3       +   6.658030          0.8787582 CGGTGTGA</a:t>
+                <a:rPr lang="en-US" sz="800" b="1" dirty="0">
+                  <a:latin typeface="Courier" pitchFamily="2" charset="0"/>
+                </a:rPr>
+                <a:t>2: chr3:128,483,452-128,483,457 6.658030          0.8787582 CGGTGTGA</a:t>
               </a:r>
-              <a:endParaRPr lang="en-US" sz="1350" dirty="0"/>
+              <a:endParaRPr lang="en-US" sz="800" dirty="0">
+                <a:latin typeface="Courier" pitchFamily="2" charset="0"/>
+              </a:endParaRPr>
             </a:p>
             <a:p>
               <a:r>
-                <a:rPr lang="en-US" sz="1350" b="1" dirty="0"/>
-                <a:t>  4: chr3:128,497,528-128,497,534   </a:t>
+                <a:rPr lang="en-US" sz="800" b="1">
+                  <a:latin typeface="Courier" pitchFamily="2" charset="0"/>
+                </a:rPr>
+                <a:t>3</a:t>
               </a:r>
-              <a:endParaRPr lang="en-US" sz="1350" dirty="0"/>
+              <a:r>
+                <a:rPr lang="en-US" sz="800" b="1" dirty="0">
+                  <a:latin typeface="Courier" pitchFamily="2" charset="0"/>
+                </a:rPr>
+                <a:t>: chr3:128,486,956-128,486,962  6.658030          0.8787582 CGGTGTGA</a:t>
+              </a:r>
+              <a:endParaRPr lang="en-US" sz="800" dirty="0">
+                <a:latin typeface="Courier" pitchFamily="2" charset="0"/>
+              </a:endParaRPr>
+            </a:p>
+            <a:p>
+              <a:r>
+                <a:rPr lang="en-US" sz="800" b="1">
+                  <a:latin typeface="Courier" pitchFamily="2" charset="0"/>
+                </a:rPr>
+                <a:t>4</a:t>
+              </a:r>
+              <a:r>
+                <a:rPr lang="en-US" sz="800" b="1" dirty="0">
+                  <a:latin typeface="Courier" pitchFamily="2" charset="0"/>
+                </a:rPr>
+                <a:t>: chr3:128,497,528-128,497,534   </a:t>
+              </a:r>
+              <a:endParaRPr lang="en-US" sz="800" dirty="0">
+                <a:latin typeface="Courier" pitchFamily="2" charset="0"/>
+              </a:endParaRPr>
             </a:p>
           </p:txBody>
         </p:sp>
@@ -10250,67 +10370,7 @@
 </p:sld>
 </file>
 
-<file path=ppt/slides/slide7.xml><?xml version="1.0" encoding="utf-8"?>
-<p:sld xmlns:a="http://schemas.openxmlformats.org/drawingml/2006/main" xmlns:r="http://schemas.openxmlformats.org/officeDocument/2006/relationships" xmlns:p="http://schemas.openxmlformats.org/presentationml/2006/main">
-  <p:cSld>
-    <p:spTree>
-      <p:nvGrpSpPr>
-        <p:cNvPr id="1" name=""/>
-        <p:cNvGrpSpPr/>
-        <p:nvPr/>
-      </p:nvGrpSpPr>
-      <p:grpSpPr>
-        <a:xfrm>
-          <a:off x="0" y="0"/>
-          <a:ext cx="0" cy="0"/>
-          <a:chOff x="0" y="0"/>
-          <a:chExt cx="0" cy="0"/>
-        </a:xfrm>
-      </p:grpSpPr>
-    </p:spTree>
-    <p:extLst>
-      <p:ext uri="{BB962C8B-B14F-4D97-AF65-F5344CB8AC3E}">
-        <p14:creationId xmlns:p14="http://schemas.microsoft.com/office/powerpoint/2010/main" val="1350115504"/>
-      </p:ext>
-    </p:extLst>
-  </p:cSld>
-  <p:clrMapOvr>
-    <a:masterClrMapping/>
-  </p:clrMapOvr>
-</p:sld>
-</file>
-
-<file path=ppt/slides/slide8.xml><?xml version="1.0" encoding="utf-8"?>
-<p:sld xmlns:a="http://schemas.openxmlformats.org/drawingml/2006/main" xmlns:r="http://schemas.openxmlformats.org/officeDocument/2006/relationships" xmlns:p="http://schemas.openxmlformats.org/presentationml/2006/main">
-  <p:cSld>
-    <p:spTree>
-      <p:nvGrpSpPr>
-        <p:cNvPr id="1" name=""/>
-        <p:cNvGrpSpPr/>
-        <p:nvPr/>
-      </p:nvGrpSpPr>
-      <p:grpSpPr>
-        <a:xfrm>
-          <a:off x="0" y="0"/>
-          <a:ext cx="0" cy="0"/>
-          <a:chOff x="0" y="0"/>
-          <a:chExt cx="0" cy="0"/>
-        </a:xfrm>
-      </p:grpSpPr>
-    </p:spTree>
-    <p:extLst>
-      <p:ext uri="{BB962C8B-B14F-4D97-AF65-F5344CB8AC3E}">
-        <p14:creationId xmlns:p14="http://schemas.microsoft.com/office/powerpoint/2010/main" val="1377644196"/>
-      </p:ext>
-    </p:extLst>
-  </p:cSld>
-  <p:clrMapOvr>
-    <a:masterClrMapping/>
-  </p:clrMapOvr>
-</p:sld>
-</file>
-
-<file path=ppt/slides/slide9.xml><?xml version="1.0" encoding="utf-8"?>
+<file path=ppt/slides/slide16.xml><?xml version="1.0" encoding="utf-8"?>
 <p:sld xmlns:a="http://schemas.openxmlformats.org/drawingml/2006/main" xmlns:r="http://schemas.openxmlformats.org/officeDocument/2006/relationships" xmlns:p="http://schemas.openxmlformats.org/presentationml/2006/main">
   <p:cSld>
     <p:spTree>
@@ -10381,6 +10441,968 @@
     <p:extLst>
       <p:ext uri="{BB962C8B-B14F-4D97-AF65-F5344CB8AC3E}">
         <p14:creationId xmlns:p14="http://schemas.microsoft.com/office/powerpoint/2010/main" val="1646328196"/>
+      </p:ext>
+    </p:extLst>
+  </p:cSld>
+  <p:clrMapOvr>
+    <a:masterClrMapping/>
+  </p:clrMapOvr>
+</p:sld>
+</file>
+
+<file path=ppt/slides/slide2.xml><?xml version="1.0" encoding="utf-8"?>
+<p:sld xmlns:a="http://schemas.openxmlformats.org/drawingml/2006/main" xmlns:r="http://schemas.openxmlformats.org/officeDocument/2006/relationships" xmlns:p="http://schemas.openxmlformats.org/presentationml/2006/main">
+  <p:cSld>
+    <p:spTree>
+      <p:nvGrpSpPr>
+        <p:cNvPr id="1" name=""/>
+        <p:cNvGrpSpPr/>
+        <p:nvPr/>
+      </p:nvGrpSpPr>
+      <p:grpSpPr>
+        <a:xfrm>
+          <a:off x="0" y="0"/>
+          <a:ext cx="0" cy="0"/>
+          <a:chOff x="0" y="0"/>
+          <a:chExt cx="0" cy="0"/>
+        </a:xfrm>
+      </p:grpSpPr>
+      <p:pic>
+        <p:nvPicPr>
+          <p:cNvPr id="2" name="Picture 1">
+            <a:extLst>
+              <a:ext uri="{FF2B5EF4-FFF2-40B4-BE49-F238E27FC236}">
+                <a16:creationId xmlns:a16="http://schemas.microsoft.com/office/drawing/2014/main" id="{1AC1CEF3-8069-8C49-80C5-73F9B071D945}"/>
+              </a:ext>
+            </a:extLst>
+          </p:cNvPr>
+          <p:cNvPicPr>
+            <a:picLocks noChangeAspect="1"/>
+          </p:cNvPicPr>
+          <p:nvPr/>
+        </p:nvPicPr>
+        <p:blipFill>
+          <a:blip r:embed="rId2"/>
+          <a:stretch>
+            <a:fillRect/>
+          </a:stretch>
+        </p:blipFill>
+        <p:spPr>
+          <a:xfrm>
+            <a:off x="1245141" y="1796591"/>
+            <a:ext cx="7834006" cy="4376421"/>
+          </a:xfrm>
+          <a:prstGeom prst="rect">
+            <a:avLst/>
+          </a:prstGeom>
+        </p:spPr>
+      </p:pic>
+      <p:sp>
+        <p:nvSpPr>
+          <p:cNvPr id="3" name="TextBox 2">
+            <a:extLst>
+              <a:ext uri="{FF2B5EF4-FFF2-40B4-BE49-F238E27FC236}">
+                <a16:creationId xmlns:a16="http://schemas.microsoft.com/office/drawing/2014/main" id="{B6CC574B-5972-794D-8FBC-EA3D75487F1C}"/>
+              </a:ext>
+            </a:extLst>
+          </p:cNvPr>
+          <p:cNvSpPr txBox="1"/>
+          <p:nvPr/>
+        </p:nvSpPr>
+        <p:spPr>
+          <a:xfrm>
+            <a:off x="2509976" y="201555"/>
+            <a:ext cx="5304336" cy="1200329"/>
+          </a:xfrm>
+          <a:prstGeom prst="rect">
+            <a:avLst/>
+          </a:prstGeom>
+          <a:noFill/>
+        </p:spPr>
+        <p:txBody>
+          <a:bodyPr wrap="none" rtlCol="0">
+            <a:spAutoFit/>
+          </a:bodyPr>
+          <a:lstStyle/>
+          <a:p>
+            <a:pPr algn="ctr"/>
+            <a:r>
+              <a:rPr lang="en-US" sz="2400" dirty="0"/>
+              <a:t>Sea Urchin </a:t>
+            </a:r>
+            <a:r>
+              <a:rPr lang="en-US" sz="2400" dirty="0" err="1"/>
+              <a:t>Endomesoderm</a:t>
+            </a:r>
+            <a:r>
+              <a:rPr lang="en-US" sz="2400" dirty="0"/>
+              <a:t> Specification </a:t>
+            </a:r>
+          </a:p>
+          <a:p>
+            <a:pPr algn="ctr"/>
+            <a:r>
+              <a:rPr lang="en-US" sz="2400" dirty="0"/>
+              <a:t>21 to 30 hours: </a:t>
+            </a:r>
+          </a:p>
+          <a:p>
+            <a:pPr algn="ctr"/>
+            <a:r>
+              <a:rPr lang="en-US" sz="2400" dirty="0"/>
+              <a:t>Davidson &amp; </a:t>
+            </a:r>
+            <a:r>
+              <a:rPr lang="en-US" sz="2400" dirty="0" err="1"/>
+              <a:t>Longabaugh</a:t>
+            </a:r>
+            <a:r>
+              <a:rPr lang="en-US" sz="2400" dirty="0"/>
+              <a:t> et al</a:t>
+            </a:r>
+          </a:p>
+        </p:txBody>
+      </p:sp>
+    </p:spTree>
+    <p:extLst>
+      <p:ext uri="{BB962C8B-B14F-4D97-AF65-F5344CB8AC3E}">
+        <p14:creationId xmlns:p14="http://schemas.microsoft.com/office/powerpoint/2010/main" val="3817902267"/>
+      </p:ext>
+    </p:extLst>
+  </p:cSld>
+  <p:clrMapOvr>
+    <a:masterClrMapping/>
+  </p:clrMapOvr>
+</p:sld>
+</file>
+
+<file path=ppt/slides/slide3.xml><?xml version="1.0" encoding="utf-8"?>
+<p:sld xmlns:a="http://schemas.openxmlformats.org/drawingml/2006/main" xmlns:r="http://schemas.openxmlformats.org/officeDocument/2006/relationships" xmlns:p="http://schemas.openxmlformats.org/presentationml/2006/main">
+  <p:cSld>
+    <p:spTree>
+      <p:nvGrpSpPr>
+        <p:cNvPr id="1" name=""/>
+        <p:cNvGrpSpPr/>
+        <p:nvPr/>
+      </p:nvGrpSpPr>
+      <p:grpSpPr>
+        <a:xfrm>
+          <a:off x="0" y="0"/>
+          <a:ext cx="0" cy="0"/>
+          <a:chOff x="0" y="0"/>
+          <a:chExt cx="0" cy="0"/>
+        </a:xfrm>
+      </p:grpSpPr>
+      <p:pic>
+        <p:nvPicPr>
+          <p:cNvPr id="1026" name="Picture 2">
+            <a:extLst>
+              <a:ext uri="{FF2B5EF4-FFF2-40B4-BE49-F238E27FC236}">
+                <a16:creationId xmlns:a16="http://schemas.microsoft.com/office/drawing/2014/main" id="{3B21AD36-8247-4440-8D20-57ADF762A2A1}"/>
+              </a:ext>
+            </a:extLst>
+          </p:cNvPr>
+          <p:cNvPicPr>
+            <a:picLocks noChangeAspect="1" noChangeArrowheads="1"/>
+          </p:cNvPicPr>
+          <p:nvPr/>
+        </p:nvPicPr>
+        <p:blipFill>
+          <a:blip r:embed="rId2">
+            <a:extLst>
+              <a:ext uri="{28A0092B-C50C-407E-A947-70E740481C1C}">
+                <a14:useLocalDpi xmlns:a14="http://schemas.microsoft.com/office/drawing/2010/main" val="0"/>
+              </a:ext>
+            </a:extLst>
+          </a:blip>
+          <a:srcRect/>
+          <a:stretch>
+            <a:fillRect/>
+          </a:stretch>
+        </p:blipFill>
+        <p:spPr bwMode="auto">
+          <a:xfrm>
+            <a:off x="2503725" y="1780161"/>
+            <a:ext cx="6379114" cy="3687594"/>
+          </a:xfrm>
+          <a:prstGeom prst="rect">
+            <a:avLst/>
+          </a:prstGeom>
+          <a:noFill/>
+          <a:extLst>
+            <a:ext uri="{909E8E84-426E-40DD-AFC4-6F175D3DCCD1}">
+              <a14:hiddenFill xmlns:a14="http://schemas.microsoft.com/office/drawing/2010/main">
+                <a:solidFill>
+                  <a:srgbClr val="FFFFFF"/>
+                </a:solidFill>
+              </a14:hiddenFill>
+            </a:ext>
+          </a:extLst>
+        </p:spPr>
+      </p:pic>
+      <p:sp>
+        <p:nvSpPr>
+          <p:cNvPr id="2" name="TextBox 1">
+            <a:extLst>
+              <a:ext uri="{FF2B5EF4-FFF2-40B4-BE49-F238E27FC236}">
+                <a16:creationId xmlns:a16="http://schemas.microsoft.com/office/drawing/2014/main" id="{B3F27301-8709-F745-A829-48B4EF29C3F7}"/>
+              </a:ext>
+            </a:extLst>
+          </p:cNvPr>
+          <p:cNvSpPr txBox="1"/>
+          <p:nvPr/>
+        </p:nvSpPr>
+        <p:spPr>
+          <a:xfrm>
+            <a:off x="2081719" y="437745"/>
+            <a:ext cx="6526402" cy="646331"/>
+          </a:xfrm>
+          <a:prstGeom prst="rect">
+            <a:avLst/>
+          </a:prstGeom>
+          <a:noFill/>
+        </p:spPr>
+        <p:txBody>
+          <a:bodyPr wrap="none" rtlCol="0">
+            <a:spAutoFit/>
+          </a:bodyPr>
+          <a:lstStyle/>
+          <a:p>
+            <a:r>
+              <a:rPr lang="en-US" dirty="0"/>
+              <a:t>Hierarchical differentiation of myeloid progenitors is encoded in the</a:t>
+            </a:r>
+          </a:p>
+          <a:p>
+            <a:r>
+              <a:rPr lang="en-US" dirty="0"/>
+              <a:t>transcription factor network.  </a:t>
+            </a:r>
+            <a:r>
+              <a:rPr lang="en-US" dirty="0" err="1"/>
+              <a:t>Krumsiek</a:t>
+            </a:r>
+            <a:r>
+              <a:rPr lang="en-US" dirty="0"/>
+              <a:t> et al, </a:t>
+            </a:r>
+            <a:r>
+              <a:rPr lang="en-US" dirty="0" err="1"/>
+              <a:t>PLoS</a:t>
+            </a:r>
+            <a:r>
+              <a:rPr lang="en-US" dirty="0"/>
+              <a:t> ONE. 2011</a:t>
+            </a:r>
+          </a:p>
+        </p:txBody>
+      </p:sp>
+    </p:spTree>
+    <p:extLst>
+      <p:ext uri="{BB962C8B-B14F-4D97-AF65-F5344CB8AC3E}">
+        <p14:creationId xmlns:p14="http://schemas.microsoft.com/office/powerpoint/2010/main" val="3987249141"/>
+      </p:ext>
+    </p:extLst>
+  </p:cSld>
+  <p:clrMapOvr>
+    <a:masterClrMapping/>
+  </p:clrMapOvr>
+</p:sld>
+</file>
+
+<file path=ppt/slides/slide4.xml><?xml version="1.0" encoding="utf-8"?>
+<p:sld xmlns:a="http://schemas.openxmlformats.org/drawingml/2006/main" xmlns:r="http://schemas.openxmlformats.org/officeDocument/2006/relationships" xmlns:p="http://schemas.openxmlformats.org/presentationml/2006/main">
+  <p:cSld>
+    <p:spTree>
+      <p:nvGrpSpPr>
+        <p:cNvPr id="1" name=""/>
+        <p:cNvGrpSpPr/>
+        <p:nvPr/>
+      </p:nvGrpSpPr>
+      <p:grpSpPr>
+        <a:xfrm>
+          <a:off x="0" y="0"/>
+          <a:ext cx="0" cy="0"/>
+          <a:chOff x="0" y="0"/>
+          <a:chExt cx="0" cy="0"/>
+        </a:xfrm>
+      </p:grpSpPr>
+      <p:pic>
+        <p:nvPicPr>
+          <p:cNvPr id="2" name="Picture 1">
+            <a:extLst>
+              <a:ext uri="{FF2B5EF4-FFF2-40B4-BE49-F238E27FC236}">
+                <a16:creationId xmlns:a16="http://schemas.microsoft.com/office/drawing/2014/main" id="{600FD5F1-AE13-F54F-93EB-BF6C60A6202A}"/>
+              </a:ext>
+            </a:extLst>
+          </p:cNvPr>
+          <p:cNvPicPr>
+            <a:picLocks noChangeAspect="1"/>
+          </p:cNvPicPr>
+          <p:nvPr/>
+        </p:nvPicPr>
+        <p:blipFill>
+          <a:blip r:embed="rId2"/>
+          <a:stretch>
+            <a:fillRect/>
+          </a:stretch>
+        </p:blipFill>
+        <p:spPr>
+          <a:xfrm>
+            <a:off x="2931867" y="1400782"/>
+            <a:ext cx="6328265" cy="4766553"/>
+          </a:xfrm>
+          <a:prstGeom prst="rect">
+            <a:avLst/>
+          </a:prstGeom>
+        </p:spPr>
+      </p:pic>
+      <p:sp>
+        <p:nvSpPr>
+          <p:cNvPr id="3" name="TextBox 2">
+            <a:extLst>
+              <a:ext uri="{FF2B5EF4-FFF2-40B4-BE49-F238E27FC236}">
+                <a16:creationId xmlns:a16="http://schemas.microsoft.com/office/drawing/2014/main" id="{CDA203B7-BB2F-294D-8EE5-A920672A932C}"/>
+              </a:ext>
+            </a:extLst>
+          </p:cNvPr>
+          <p:cNvSpPr txBox="1"/>
+          <p:nvPr/>
+        </p:nvSpPr>
+        <p:spPr>
+          <a:xfrm>
+            <a:off x="1429966" y="603115"/>
+            <a:ext cx="8856784" cy="646331"/>
+          </a:xfrm>
+          <a:prstGeom prst="rect">
+            <a:avLst/>
+          </a:prstGeom>
+          <a:noFill/>
+        </p:spPr>
+        <p:txBody>
+          <a:bodyPr wrap="none" rtlCol="0">
+            <a:spAutoFit/>
+          </a:bodyPr>
+          <a:lstStyle/>
+          <a:p>
+            <a:r>
+              <a:rPr lang="en-US" dirty="0"/>
+              <a:t>Reconstructing blood stem cell regulatory network models from single-cell molecular profile</a:t>
+            </a:r>
+          </a:p>
+          <a:p>
+            <a:r>
+              <a:rPr lang="en-US" dirty="0" err="1"/>
+              <a:t>Hamey</a:t>
+            </a:r>
+            <a:r>
+              <a:rPr lang="en-US" dirty="0"/>
+              <a:t> et al, PNAS 2017</a:t>
+            </a:r>
+          </a:p>
+        </p:txBody>
+      </p:sp>
+    </p:spTree>
+    <p:extLst>
+      <p:ext uri="{BB962C8B-B14F-4D97-AF65-F5344CB8AC3E}">
+        <p14:creationId xmlns:p14="http://schemas.microsoft.com/office/powerpoint/2010/main" val="1217951393"/>
+      </p:ext>
+    </p:extLst>
+  </p:cSld>
+  <p:clrMapOvr>
+    <a:masterClrMapping/>
+  </p:clrMapOvr>
+</p:sld>
+</file>
+
+<file path=ppt/slides/slide5.xml><?xml version="1.0" encoding="utf-8"?>
+<p:sld xmlns:a="http://schemas.openxmlformats.org/drawingml/2006/main" xmlns:r="http://schemas.openxmlformats.org/officeDocument/2006/relationships" xmlns:p="http://schemas.openxmlformats.org/presentationml/2006/main">
+  <p:cSld>
+    <p:spTree>
+      <p:nvGrpSpPr>
+        <p:cNvPr id="1" name=""/>
+        <p:cNvGrpSpPr/>
+        <p:nvPr/>
+      </p:nvGrpSpPr>
+      <p:grpSpPr>
+        <a:xfrm>
+          <a:off x="0" y="0"/>
+          <a:ext cx="0" cy="0"/>
+          <a:chOff x="0" y="0"/>
+          <a:chExt cx="0" cy="0"/>
+        </a:xfrm>
+      </p:grpSpPr>
+      <p:sp>
+        <p:nvSpPr>
+          <p:cNvPr id="4" name="Rectangle 3">
+            <a:extLst>
+              <a:ext uri="{FF2B5EF4-FFF2-40B4-BE49-F238E27FC236}">
+                <a16:creationId xmlns:a16="http://schemas.microsoft.com/office/drawing/2014/main" id="{2297BD73-B63A-424B-8FC2-AE6EDCBC4AD3}"/>
+              </a:ext>
+            </a:extLst>
+          </p:cNvPr>
+          <p:cNvSpPr/>
+          <p:nvPr/>
+        </p:nvSpPr>
+        <p:spPr>
+          <a:xfrm>
+            <a:off x="1649723" y="4761517"/>
+            <a:ext cx="8177719" cy="646331"/>
+          </a:xfrm>
+          <a:prstGeom prst="rect">
+            <a:avLst/>
+          </a:prstGeom>
+        </p:spPr>
+        <p:txBody>
+          <a:bodyPr wrap="square">
+            <a:spAutoFit/>
+          </a:bodyPr>
+          <a:lstStyle/>
+          <a:p>
+            <a:r>
+              <a:rPr lang="en-US" dirty="0" err="1">
+                <a:solidFill>
+                  <a:srgbClr val="222222"/>
+                </a:solidFill>
+                <a:latin typeface="Arial" panose="020B0604020202020204" pitchFamily="34" charset="0"/>
+              </a:rPr>
+              <a:t>Zeddies</a:t>
+            </a:r>
+            <a:r>
+              <a:rPr lang="en-US" dirty="0">
+                <a:solidFill>
+                  <a:srgbClr val="222222"/>
+                </a:solidFill>
+                <a:latin typeface="Arial" panose="020B0604020202020204" pitchFamily="34" charset="0"/>
+              </a:rPr>
+              <a:t>, Sabrina, et al. "MEIS1 regulates early erythroid and megakaryocytic cell fate." </a:t>
+            </a:r>
+            <a:r>
+              <a:rPr lang="en-US" i="1" dirty="0" err="1">
+                <a:solidFill>
+                  <a:srgbClr val="222222"/>
+                </a:solidFill>
+                <a:latin typeface="Arial" panose="020B0604020202020204" pitchFamily="34" charset="0"/>
+              </a:rPr>
+              <a:t>Haematologica</a:t>
+            </a:r>
+            <a:r>
+              <a:rPr lang="en-US" dirty="0">
+                <a:solidFill>
+                  <a:srgbClr val="222222"/>
+                </a:solidFill>
+                <a:latin typeface="Arial" panose="020B0604020202020204" pitchFamily="34" charset="0"/>
+              </a:rPr>
+              <a:t> 99.10 (2014): 1555-1564.</a:t>
+            </a:r>
+            <a:endParaRPr lang="en-US" dirty="0"/>
+          </a:p>
+        </p:txBody>
+      </p:sp>
+      <p:pic>
+        <p:nvPicPr>
+          <p:cNvPr id="6" name="Picture 5">
+            <a:extLst>
+              <a:ext uri="{FF2B5EF4-FFF2-40B4-BE49-F238E27FC236}">
+                <a16:creationId xmlns:a16="http://schemas.microsoft.com/office/drawing/2014/main" id="{AEBC8BBC-BCBA-EC4F-AE3E-CEA797A35A3E}"/>
+              </a:ext>
+            </a:extLst>
+          </p:cNvPr>
+          <p:cNvPicPr>
+            <a:picLocks noChangeAspect="1"/>
+          </p:cNvPicPr>
+          <p:nvPr/>
+        </p:nvPicPr>
+        <p:blipFill>
+          <a:blip r:embed="rId2"/>
+          <a:stretch>
+            <a:fillRect/>
+          </a:stretch>
+        </p:blipFill>
+        <p:spPr>
+          <a:xfrm>
+            <a:off x="1070776" y="1829531"/>
+            <a:ext cx="10050446" cy="2385807"/>
+          </a:xfrm>
+          <a:prstGeom prst="rect">
+            <a:avLst/>
+          </a:prstGeom>
+        </p:spPr>
+      </p:pic>
+      <p:sp>
+        <p:nvSpPr>
+          <p:cNvPr id="16" name="Rectangle 15">
+            <a:extLst>
+              <a:ext uri="{FF2B5EF4-FFF2-40B4-BE49-F238E27FC236}">
+                <a16:creationId xmlns:a16="http://schemas.microsoft.com/office/drawing/2014/main" id="{9D251A5D-49EE-B648-8F9E-AFE178A14B52}"/>
+              </a:ext>
+            </a:extLst>
+          </p:cNvPr>
+          <p:cNvSpPr/>
+          <p:nvPr/>
+        </p:nvSpPr>
+        <p:spPr>
+          <a:xfrm>
+            <a:off x="1548319" y="341042"/>
+            <a:ext cx="9095361" cy="646331"/>
+          </a:xfrm>
+          <a:prstGeom prst="rect">
+            <a:avLst/>
+          </a:prstGeom>
+        </p:spPr>
+        <p:txBody>
+          <a:bodyPr wrap="square">
+            <a:spAutoFit/>
+          </a:bodyPr>
+          <a:lstStyle/>
+          <a:p>
+            <a:r>
+              <a:rPr lang="en-US" dirty="0" err="1">
+                <a:solidFill>
+                  <a:srgbClr val="222222"/>
+                </a:solidFill>
+                <a:latin typeface="Arial" panose="020B0604020202020204" pitchFamily="34" charset="0"/>
+              </a:rPr>
+              <a:t>Corces</a:t>
+            </a:r>
+            <a:r>
+              <a:rPr lang="en-US" dirty="0">
+                <a:solidFill>
+                  <a:srgbClr val="222222"/>
+                </a:solidFill>
+                <a:latin typeface="Arial" panose="020B0604020202020204" pitchFamily="34" charset="0"/>
+              </a:rPr>
+              <a:t>, M. Ryan, et al. "Lineage-specific and single-cell chromatin accessibility charts human hematopoiesis and leukemia evolution." </a:t>
+            </a:r>
+            <a:r>
+              <a:rPr lang="en-US" i="1" dirty="0">
+                <a:solidFill>
+                  <a:srgbClr val="222222"/>
+                </a:solidFill>
+                <a:latin typeface="Arial" panose="020B0604020202020204" pitchFamily="34" charset="0"/>
+              </a:rPr>
+              <a:t>Nature genetics</a:t>
+            </a:r>
+            <a:r>
+              <a:rPr lang="en-US" dirty="0">
+                <a:solidFill>
+                  <a:srgbClr val="222222"/>
+                </a:solidFill>
+                <a:latin typeface="Arial" panose="020B0604020202020204" pitchFamily="34" charset="0"/>
+              </a:rPr>
+              <a:t> 48.10 (2016): 1193.</a:t>
+            </a:r>
+            <a:endParaRPr lang="en-US" dirty="0"/>
+          </a:p>
+        </p:txBody>
+      </p:sp>
+      <p:sp>
+        <p:nvSpPr>
+          <p:cNvPr id="17" name="TextBox 16">
+            <a:extLst>
+              <a:ext uri="{FF2B5EF4-FFF2-40B4-BE49-F238E27FC236}">
+                <a16:creationId xmlns:a16="http://schemas.microsoft.com/office/drawing/2014/main" id="{1557CA60-0B11-E64E-B05A-8455099B3129}"/>
+              </a:ext>
+            </a:extLst>
+          </p:cNvPr>
+          <p:cNvSpPr txBox="1"/>
+          <p:nvPr/>
+        </p:nvSpPr>
+        <p:spPr>
+          <a:xfrm>
+            <a:off x="3819563" y="1080820"/>
+            <a:ext cx="3838038" cy="369332"/>
+          </a:xfrm>
+          <a:prstGeom prst="rect">
+            <a:avLst/>
+          </a:prstGeom>
+          <a:noFill/>
+        </p:spPr>
+        <p:txBody>
+          <a:bodyPr wrap="none" rtlCol="0">
+            <a:spAutoFit/>
+          </a:bodyPr>
+          <a:lstStyle/>
+          <a:p>
+            <a:r>
+              <a:rPr lang="en-US" dirty="0"/>
+              <a:t>FIMO 1e-4      phast7 conservation 50%</a:t>
+            </a:r>
+          </a:p>
+        </p:txBody>
+      </p:sp>
+    </p:spTree>
+    <p:extLst>
+      <p:ext uri="{BB962C8B-B14F-4D97-AF65-F5344CB8AC3E}">
+        <p14:creationId xmlns:p14="http://schemas.microsoft.com/office/powerpoint/2010/main" val="1350115504"/>
+      </p:ext>
+    </p:extLst>
+  </p:cSld>
+  <p:clrMapOvr>
+    <a:masterClrMapping/>
+  </p:clrMapOvr>
+</p:sld>
+</file>
+
+<file path=ppt/slides/slide6.xml><?xml version="1.0" encoding="utf-8"?>
+<p:sld xmlns:a="http://schemas.openxmlformats.org/drawingml/2006/main" xmlns:r="http://schemas.openxmlformats.org/officeDocument/2006/relationships" xmlns:p="http://schemas.openxmlformats.org/presentationml/2006/main">
+  <p:cSld>
+    <p:spTree>
+      <p:nvGrpSpPr>
+        <p:cNvPr id="1" name=""/>
+        <p:cNvGrpSpPr/>
+        <p:nvPr/>
+      </p:nvGrpSpPr>
+      <p:grpSpPr>
+        <a:xfrm>
+          <a:off x="0" y="0"/>
+          <a:ext cx="0" cy="0"/>
+          <a:chOff x="0" y="0"/>
+          <a:chExt cx="0" cy="0"/>
+        </a:xfrm>
+      </p:grpSpPr>
+      <p:pic>
+        <p:nvPicPr>
+          <p:cNvPr id="2" name="Picture 1">
+            <a:extLst>
+              <a:ext uri="{FF2B5EF4-FFF2-40B4-BE49-F238E27FC236}">
+                <a16:creationId xmlns:a16="http://schemas.microsoft.com/office/drawing/2014/main" id="{36E6A6BE-3E49-F24F-B7AB-431E9A796B74}"/>
+              </a:ext>
+            </a:extLst>
+          </p:cNvPr>
+          <p:cNvPicPr>
+            <a:picLocks noChangeAspect="1"/>
+          </p:cNvPicPr>
+          <p:nvPr/>
+        </p:nvPicPr>
+        <p:blipFill>
+          <a:blip r:embed="rId2"/>
+          <a:stretch>
+            <a:fillRect/>
+          </a:stretch>
+        </p:blipFill>
+        <p:spPr>
+          <a:xfrm>
+            <a:off x="1815348" y="603760"/>
+            <a:ext cx="8561304" cy="6030504"/>
+          </a:xfrm>
+          <a:prstGeom prst="rect">
+            <a:avLst/>
+          </a:prstGeom>
+        </p:spPr>
+      </p:pic>
+    </p:spTree>
+    <p:extLst>
+      <p:ext uri="{BB962C8B-B14F-4D97-AF65-F5344CB8AC3E}">
+        <p14:creationId xmlns:p14="http://schemas.microsoft.com/office/powerpoint/2010/main" val="1377644196"/>
+      </p:ext>
+    </p:extLst>
+  </p:cSld>
+  <p:clrMapOvr>
+    <a:masterClrMapping/>
+  </p:clrMapOvr>
+</p:sld>
+</file>
+
+<file path=ppt/slides/slide7.xml><?xml version="1.0" encoding="utf-8"?>
+<p:sld xmlns:a="http://schemas.openxmlformats.org/drawingml/2006/main" xmlns:r="http://schemas.openxmlformats.org/officeDocument/2006/relationships" xmlns:p="http://schemas.openxmlformats.org/presentationml/2006/main" show="0">
+  <p:cSld>
+    <p:spTree>
+      <p:nvGrpSpPr>
+        <p:cNvPr id="1" name=""/>
+        <p:cNvGrpSpPr/>
+        <p:nvPr/>
+      </p:nvGrpSpPr>
+      <p:grpSpPr>
+        <a:xfrm>
+          <a:off x="0" y="0"/>
+          <a:ext cx="0" cy="0"/>
+          <a:chOff x="0" y="0"/>
+          <a:chExt cx="0" cy="0"/>
+        </a:xfrm>
+      </p:grpSpPr>
+      <p:pic>
+        <p:nvPicPr>
+          <p:cNvPr id="2" name="Picture 1">
+            <a:extLst>
+              <a:ext uri="{FF2B5EF4-FFF2-40B4-BE49-F238E27FC236}">
+                <a16:creationId xmlns:a16="http://schemas.microsoft.com/office/drawing/2014/main" id="{E74A8931-AE9C-1645-8F38-ABEC59BA3CF4}"/>
+              </a:ext>
+            </a:extLst>
+          </p:cNvPr>
+          <p:cNvPicPr>
+            <a:picLocks noChangeAspect="1"/>
+          </p:cNvPicPr>
+          <p:nvPr/>
+        </p:nvPicPr>
+        <p:blipFill>
+          <a:blip r:embed="rId2"/>
+          <a:stretch>
+            <a:fillRect/>
+          </a:stretch>
+        </p:blipFill>
+        <p:spPr>
+          <a:xfrm>
+            <a:off x="1125739" y="2898019"/>
+            <a:ext cx="9662809" cy="2143462"/>
+          </a:xfrm>
+          <a:prstGeom prst="rect">
+            <a:avLst/>
+          </a:prstGeom>
+        </p:spPr>
+      </p:pic>
+      <p:sp>
+        <p:nvSpPr>
+          <p:cNvPr id="3" name="TextBox 2">
+            <a:extLst>
+              <a:ext uri="{FF2B5EF4-FFF2-40B4-BE49-F238E27FC236}">
+                <a16:creationId xmlns:a16="http://schemas.microsoft.com/office/drawing/2014/main" id="{F39A057B-EA3E-D647-9665-B1955E4AD16C}"/>
+              </a:ext>
+            </a:extLst>
+          </p:cNvPr>
+          <p:cNvSpPr txBox="1"/>
+          <p:nvPr/>
+        </p:nvSpPr>
+        <p:spPr>
+          <a:xfrm>
+            <a:off x="1634247" y="671208"/>
+            <a:ext cx="9154301" cy="1077218"/>
+          </a:xfrm>
+          <a:prstGeom prst="rect">
+            <a:avLst/>
+          </a:prstGeom>
+          <a:noFill/>
+        </p:spPr>
+        <p:txBody>
+          <a:bodyPr wrap="none" rtlCol="0">
+            <a:spAutoFit/>
+          </a:bodyPr>
+          <a:lstStyle/>
+          <a:p>
+            <a:pPr algn="ctr"/>
+            <a:r>
+              <a:rPr lang="en-US" sz="3200" dirty="0"/>
+              <a:t>Trena model of GATA2 in </a:t>
+            </a:r>
+            <a:r>
+              <a:rPr lang="en-US" sz="3200" dirty="0" err="1"/>
+              <a:t>Eryrthropoiesis</a:t>
+            </a:r>
+            <a:r>
+              <a:rPr lang="en-US" sz="3200" dirty="0"/>
+              <a:t> Time Course </a:t>
+            </a:r>
+          </a:p>
+          <a:p>
+            <a:pPr algn="ctr"/>
+            <a:r>
+              <a:rPr lang="en-US" sz="3200" dirty="0"/>
+              <a:t>(Brand &amp; </a:t>
+            </a:r>
+            <a:r>
+              <a:rPr lang="en-US" sz="3200" dirty="0" err="1"/>
+              <a:t>Ranish</a:t>
+            </a:r>
+            <a:r>
+              <a:rPr lang="en-US" sz="3200" dirty="0"/>
+              <a:t>)</a:t>
+            </a:r>
+          </a:p>
+        </p:txBody>
+      </p:sp>
+      <p:sp>
+        <p:nvSpPr>
+          <p:cNvPr id="4" name="Rectangle 3">
+            <a:extLst>
+              <a:ext uri="{FF2B5EF4-FFF2-40B4-BE49-F238E27FC236}">
+                <a16:creationId xmlns:a16="http://schemas.microsoft.com/office/drawing/2014/main" id="{AC2060E2-F5E8-4C45-99F3-ABC596C313B9}"/>
+              </a:ext>
+            </a:extLst>
+          </p:cNvPr>
+          <p:cNvSpPr/>
+          <p:nvPr/>
+        </p:nvSpPr>
+        <p:spPr>
+          <a:xfrm>
+            <a:off x="4176981" y="2066887"/>
+            <a:ext cx="3838038" cy="369332"/>
+          </a:xfrm>
+          <a:prstGeom prst="rect">
+            <a:avLst/>
+          </a:prstGeom>
+        </p:spPr>
+        <p:txBody>
+          <a:bodyPr wrap="none">
+            <a:spAutoFit/>
+          </a:bodyPr>
+          <a:lstStyle/>
+          <a:p>
+            <a:r>
+              <a:rPr lang="en-US" dirty="0"/>
+              <a:t>FIMO 1e-4      phast7 conservation 90%</a:t>
+            </a:r>
+          </a:p>
+        </p:txBody>
+      </p:sp>
+    </p:spTree>
+    <p:extLst>
+      <p:ext uri="{BB962C8B-B14F-4D97-AF65-F5344CB8AC3E}">
+        <p14:creationId xmlns:p14="http://schemas.microsoft.com/office/powerpoint/2010/main" val="681417066"/>
+      </p:ext>
+    </p:extLst>
+  </p:cSld>
+  <p:clrMapOvr>
+    <a:masterClrMapping/>
+  </p:clrMapOvr>
+</p:sld>
+</file>
+
+<file path=ppt/slides/slide8.xml><?xml version="1.0" encoding="utf-8"?>
+<p:sld xmlns:a="http://schemas.openxmlformats.org/drawingml/2006/main" xmlns:r="http://schemas.openxmlformats.org/officeDocument/2006/relationships" xmlns:p="http://schemas.openxmlformats.org/presentationml/2006/main" show="0">
+  <p:cSld>
+    <p:spTree>
+      <p:nvGrpSpPr>
+        <p:cNvPr id="1" name=""/>
+        <p:cNvGrpSpPr/>
+        <p:nvPr/>
+      </p:nvGrpSpPr>
+      <p:grpSpPr>
+        <a:xfrm>
+          <a:off x="0" y="0"/>
+          <a:ext cx="0" cy="0"/>
+          <a:chOff x="0" y="0"/>
+          <a:chExt cx="0" cy="0"/>
+        </a:xfrm>
+      </p:grpSpPr>
+      <p:pic>
+        <p:nvPicPr>
+          <p:cNvPr id="3" name="Picture 2">
+            <a:extLst>
+              <a:ext uri="{FF2B5EF4-FFF2-40B4-BE49-F238E27FC236}">
+                <a16:creationId xmlns:a16="http://schemas.microsoft.com/office/drawing/2014/main" id="{F0911422-89EA-2F42-B533-602472D35048}"/>
+              </a:ext>
+            </a:extLst>
+          </p:cNvPr>
+          <p:cNvPicPr>
+            <a:picLocks noChangeAspect="1"/>
+          </p:cNvPicPr>
+          <p:nvPr/>
+        </p:nvPicPr>
+        <p:blipFill>
+          <a:blip r:embed="rId2"/>
+          <a:stretch>
+            <a:fillRect/>
+          </a:stretch>
+        </p:blipFill>
+        <p:spPr>
+          <a:xfrm>
+            <a:off x="3050432" y="383432"/>
+            <a:ext cx="6091136" cy="6091136"/>
+          </a:xfrm>
+          <a:prstGeom prst="rect">
+            <a:avLst/>
+          </a:prstGeom>
+        </p:spPr>
+      </p:pic>
+    </p:spTree>
+    <p:extLst>
+      <p:ext uri="{BB962C8B-B14F-4D97-AF65-F5344CB8AC3E}">
+        <p14:creationId xmlns:p14="http://schemas.microsoft.com/office/powerpoint/2010/main" val="983767464"/>
+      </p:ext>
+    </p:extLst>
+  </p:cSld>
+  <p:clrMapOvr>
+    <a:masterClrMapping/>
+  </p:clrMapOvr>
+</p:sld>
+</file>
+
+<file path=ppt/slides/slide9.xml><?xml version="1.0" encoding="utf-8"?>
+<p:sld xmlns:a="http://schemas.openxmlformats.org/drawingml/2006/main" xmlns:r="http://schemas.openxmlformats.org/officeDocument/2006/relationships" xmlns:p="http://schemas.openxmlformats.org/presentationml/2006/main" show="0">
+  <p:cSld>
+    <p:spTree>
+      <p:nvGrpSpPr>
+        <p:cNvPr id="1" name=""/>
+        <p:cNvGrpSpPr/>
+        <p:nvPr/>
+      </p:nvGrpSpPr>
+      <p:grpSpPr>
+        <a:xfrm>
+          <a:off x="0" y="0"/>
+          <a:ext cx="0" cy="0"/>
+          <a:chOff x="0" y="0"/>
+          <a:chExt cx="0" cy="0"/>
+        </a:xfrm>
+      </p:grpSpPr>
+      <p:pic>
+        <p:nvPicPr>
+          <p:cNvPr id="2" name="Picture 1">
+            <a:extLst>
+              <a:ext uri="{FF2B5EF4-FFF2-40B4-BE49-F238E27FC236}">
+                <a16:creationId xmlns:a16="http://schemas.microsoft.com/office/drawing/2014/main" id="{FC05AC39-64D5-8C4B-A1BF-987C3F780A40}"/>
+              </a:ext>
+            </a:extLst>
+          </p:cNvPr>
+          <p:cNvPicPr>
+            <a:picLocks noChangeAspect="1"/>
+          </p:cNvPicPr>
+          <p:nvPr/>
+        </p:nvPicPr>
+        <p:blipFill>
+          <a:blip r:embed="rId2"/>
+          <a:stretch>
+            <a:fillRect/>
+          </a:stretch>
+        </p:blipFill>
+        <p:spPr>
+          <a:xfrm>
+            <a:off x="0" y="1552134"/>
+            <a:ext cx="12192000" cy="3753732"/>
+          </a:xfrm>
+          <a:prstGeom prst="rect">
+            <a:avLst/>
+          </a:prstGeom>
+        </p:spPr>
+      </p:pic>
+      <p:sp>
+        <p:nvSpPr>
+          <p:cNvPr id="3" name="TextBox 2">
+            <a:extLst>
+              <a:ext uri="{FF2B5EF4-FFF2-40B4-BE49-F238E27FC236}">
+                <a16:creationId xmlns:a16="http://schemas.microsoft.com/office/drawing/2014/main" id="{B7A71EF2-B123-6442-B128-302E8278E755}"/>
+              </a:ext>
+            </a:extLst>
+          </p:cNvPr>
+          <p:cNvSpPr txBox="1"/>
+          <p:nvPr/>
+        </p:nvSpPr>
+        <p:spPr>
+          <a:xfrm>
+            <a:off x="3977439" y="593388"/>
+            <a:ext cx="4237122" cy="523220"/>
+          </a:xfrm>
+          <a:prstGeom prst="rect">
+            <a:avLst/>
+          </a:prstGeom>
+          <a:noFill/>
+        </p:spPr>
+        <p:txBody>
+          <a:bodyPr wrap="none" rtlCol="0">
+            <a:spAutoFit/>
+          </a:bodyPr>
+          <a:lstStyle/>
+          <a:p>
+            <a:r>
+              <a:rPr lang="en-US" sz="2800" dirty="0"/>
+              <a:t>~Promoter Region of GATA2</a:t>
+            </a:r>
+          </a:p>
+        </p:txBody>
+      </p:sp>
+    </p:spTree>
+    <p:extLst>
+      <p:ext uri="{BB962C8B-B14F-4D97-AF65-F5344CB8AC3E}">
+        <p14:creationId xmlns:p14="http://schemas.microsoft.com/office/powerpoint/2010/main" val="1564305151"/>
       </p:ext>
     </p:extLst>
   </p:cSld>

</xml_diff>